<commit_message>
update shipping sticker template
</commit_message>
<xml_diff>
--- a/template/Shipping_Sticker_Template.pptx
+++ b/template/Shipping_Sticker_Template.pptx
@@ -257,7 +257,7 @@
       </p15:sldGuideLst>
     </p:ext>
     <p:ext uri="GoogleSlidesCustomDataVersion2">
-      <go:slidesCustomData xmlns:go="http://customooxmlschemas.google.com/" xmlns:ahyp="http://schemas.microsoft.com/office/drawing/2018/hyperlinkcolor" xmlns:p15="http://schemas.microsoft.com/office/powerpoint/2012/main" xmlns:p14="http://schemas.microsoft.com/office/powerpoint/2010/main" xmlns:com="http://schemas.openxmlformats.org/drawingml/2006/compatibility" xmlns:pvml="urn:schemas-microsoft-com:office:powerpoint" xmlns:v="urn:schemas-microsoft-com:vml" xmlns:o="urn:schemas-microsoft-com:office:office" xmlns:dgm="http://schemas.openxmlformats.org/drawingml/2006/diagram" xmlns:c="http://schemas.openxmlformats.org/drawingml/2006/chart" xmlns:mv="urn:schemas-microsoft-com:mac:vml" xmlns:mc="http://schemas.openxmlformats.org/markup-compatibility/2006" xmlns="" r:id="rId7" roundtripDataSignature="AMtx7mglTbCmT6z3d2u+ititL5E+TBpZJw=="/>
+      <go:slidesCustomData xmlns="" xmlns:mc="http://schemas.openxmlformats.org/markup-compatibility/2006" xmlns:mv="urn:schemas-microsoft-com:mac:vml" xmlns:c="http://schemas.openxmlformats.org/drawingml/2006/chart" xmlns:dgm="http://schemas.openxmlformats.org/drawingml/2006/diagram" xmlns:o="urn:schemas-microsoft-com:office:office" xmlns:v="urn:schemas-microsoft-com:vml" xmlns:pvml="urn:schemas-microsoft-com:office:powerpoint" xmlns:com="http://schemas.openxmlformats.org/drawingml/2006/compatibility" xmlns:p14="http://schemas.microsoft.com/office/powerpoint/2010/main" xmlns:p15="http://schemas.microsoft.com/office/powerpoint/2012/main" xmlns:ahyp="http://schemas.microsoft.com/office/drawing/2018/hyperlinkcolor" xmlns:go="http://customooxmlschemas.google.com/" r:id="rId7" roundtripDataSignature="AMtx7mglTbCmT6z3d2u+ititL5E+TBpZJw=="/>
     </p:ext>
   </p:extLst>
 </p:presentation>
@@ -10671,7 +10671,7 @@
         </p:nvSpPr>
         <p:spPr>
           <a:xfrm>
-            <a:off x="511626" y="1734086"/>
+            <a:off x="711324" y="1734086"/>
             <a:ext cx="6509659" cy="675300"/>
           </a:xfrm>
           <a:prstGeom prst="rect">
@@ -10718,7 +10718,7 @@
         </p:nvSpPr>
         <p:spPr>
           <a:xfrm>
-            <a:off x="892628" y="2409386"/>
+            <a:off x="713012" y="2409386"/>
             <a:ext cx="8251372" cy="677068"/>
           </a:xfrm>
           <a:prstGeom prst="rect">
@@ -10779,7 +10779,7 @@
         </p:nvSpPr>
         <p:spPr>
           <a:xfrm>
-            <a:off x="892627" y="3350567"/>
+            <a:off x="734975" y="3350567"/>
             <a:ext cx="4942115" cy="461700"/>
           </a:xfrm>
           <a:prstGeom prst="rect">
@@ -10843,7 +10843,7 @@
         </p:nvSpPr>
         <p:spPr>
           <a:xfrm>
-            <a:off x="892627" y="2888902"/>
+            <a:off x="724463" y="2888902"/>
             <a:ext cx="7892143" cy="461665"/>
           </a:xfrm>
           <a:prstGeom prst="rect">

</xml_diff>